<commit_message>
fix ppt textbox oversize
</commit_message>
<xml_diff>
--- a/移动计算及云计算场景下的分布共享数据服务技术研究.pptx
+++ b/移动计算及云计算场景下的分布共享数据服务技术研究.pptx
@@ -15062,11 +15062,7 @@
             </a:r>
             <a:r>
               <a:rPr lang="zh-CN" altLang="en-US" dirty="0" smtClean="0"/>
-              <a:t>系统的</a:t>
-            </a:r>
-            <a:r>
-              <a:rPr lang="zh-CN" altLang="en-US" dirty="0" smtClean="0"/>
-              <a:t>问题空间</a:t>
+              <a:t>系统的问题空间</a:t>
             </a:r>
             <a:endParaRPr lang="en-US" altLang="zh-CN" dirty="0" smtClean="0">
               <a:solidFill>
@@ -15085,11 +15081,7 @@
             </a:r>
             <a:r>
               <a:rPr lang="zh-CN" altLang="en-US" dirty="0" smtClean="0"/>
-              <a:t>系统及调研相关</a:t>
-            </a:r>
-            <a:r>
-              <a:rPr lang="zh-CN" altLang="en-US" dirty="0" smtClean="0"/>
-              <a:t>工具</a:t>
+              <a:t>系统及调研相关工具</a:t>
             </a:r>
             <a:endParaRPr lang="en-US" altLang="zh-CN" dirty="0" smtClean="0"/>
           </a:p>
@@ -16675,11 +16667,7 @@
             </a:r>
             <a:r>
               <a:rPr lang="zh-CN" altLang="en-US" dirty="0" smtClean="0"/>
-              <a:t>个数据</a:t>
-            </a:r>
-            <a:r>
-              <a:rPr lang="zh-CN" altLang="en-US" dirty="0" smtClean="0"/>
-              <a:t>中心</a:t>
+              <a:t>个数据中心</a:t>
             </a:r>
             <a:endParaRPr lang="en-US" altLang="zh-CN" dirty="0" smtClean="0"/>
           </a:p>
@@ -16881,7 +16869,7 @@
         <p:spPr>
           <a:xfrm>
             <a:off x="434320" y="1449666"/>
-            <a:ext cx="8229600" cy="7478970"/>
+            <a:ext cx="8229600" cy="5024218"/>
           </a:xfrm>
         </p:spPr>
         <p:txBody>
@@ -17193,15 +17181,7 @@
             <a:pPr lvl="1"/>
             <a:r>
               <a:rPr lang="zh-CN" altLang="en-US" dirty="0" smtClean="0"/>
-              <a:t>远程</a:t>
-            </a:r>
-            <a:r>
-              <a:rPr lang="zh-CN" altLang="en-US" dirty="0" smtClean="0"/>
-              <a:t>批量</a:t>
-            </a:r>
-            <a:r>
-              <a:rPr lang="zh-CN" altLang="en-US" dirty="0" smtClean="0"/>
-              <a:t>启动和停止</a:t>
+              <a:t>远程批量启动和停止</a:t>
             </a:r>
             <a:r>
               <a:rPr lang="en-US" altLang="zh-CN" dirty="0" err="1" smtClean="0"/>
@@ -17213,11 +17193,7 @@
             <a:pPr lvl="1"/>
             <a:r>
               <a:rPr lang="zh-CN" altLang="en-US" dirty="0" smtClean="0"/>
-              <a:t>远程运行日志</a:t>
-            </a:r>
-            <a:r>
-              <a:rPr lang="zh-CN" altLang="en-US" dirty="0" smtClean="0"/>
-              <a:t>汇总</a:t>
+              <a:t>远程运行日志汇总</a:t>
             </a:r>
             <a:endParaRPr lang="en-US" altLang="zh-CN" dirty="0" smtClean="0"/>
           </a:p>
@@ -17909,6 +17885,13 @@
   <p:clrMapOvr>
     <a:masterClrMapping/>
   </p:clrMapOvr>
+  <p:timing>
+    <p:tnLst>
+      <p:par>
+        <p:cTn id="1" dur="indefinite" restart="never" nodeType="tmRoot"/>
+      </p:par>
+    </p:tnLst>
+  </p:timing>
 </p:sld>
 </file>
 
@@ -18798,11 +18781,7 @@
             </a:r>
             <a:r>
               <a:rPr lang="zh-CN" altLang="en-US" dirty="0" smtClean="0"/>
-              <a:t>权值高，不同</a:t>
-            </a:r>
-            <a:r>
-              <a:rPr lang="zh-CN" altLang="en-US" dirty="0" smtClean="0"/>
-              <a:t>进程</a:t>
+              <a:t>权值高，不同进程</a:t>
             </a:r>
             <a:r>
               <a:rPr lang="en-US" altLang="zh-CN" dirty="0" smtClean="0"/>
@@ -19108,7 +19087,7 @@
         <p:spPr>
           <a:xfrm>
             <a:off x="457200" y="4005064"/>
-            <a:ext cx="7543800" cy="3471720"/>
+            <a:ext cx="7543800" cy="2304256"/>
           </a:xfrm>
           <a:prstGeom prst="rect">
             <a:avLst/>
@@ -20998,7 +20977,7 @@
           <a:graphicData uri="http://schemas.openxmlformats.org/presentationml/2006/ole">
             <mc:AlternateContent xmlns:mc="http://schemas.openxmlformats.org/markup-compatibility/2006">
               <mc:Choice xmlns:v="urn:schemas-microsoft-com:vml" Requires="v">
-                <p:oleObj spid="_x0000_s1138" name="Document" r:id="rId4" imgW="3004786" imgH="2805406" progId="Word.Document.8">
+                <p:oleObj spid="_x0000_s1139" name="Document" r:id="rId4" imgW="3004786" imgH="2805406" progId="Word.Document.8">
                   <p:embed/>
                 </p:oleObj>
               </mc:Choice>

</xml_diff>